<commit_message>
Update 2. Graph Metrics and Random Models.pptx
</commit_message>
<xml_diff>
--- a/slides/2. Graph Metrics and Random Models.pptx
+++ b/slides/2. Graph Metrics and Random Models.pptx
@@ -2083,7 +2083,7 @@
           <a:p>
             <a:fld id="{1B6E2612-5213-4B6B-99A8-BAC5DC9C4481}" type="datetimeFigureOut">
               <a:rPr lang="en-US" smtClean="0"/>
-              <a:t>4/27/2022</a:t>
+              <a:t>5/3/2022</a:t>
             </a:fld>
             <a:endParaRPr lang="en-US"/>
           </a:p>
@@ -5754,7 +5754,7 @@
           <a:p>
             <a:fld id="{A6E657D4-341B-4123-93E2-EE63B48CE7B9}" type="datetime1">
               <a:rPr lang="en-US" smtClean="0"/>
-              <a:t>4/27/2022</a:t>
+              <a:t>5/3/2022</a:t>
             </a:fld>
             <a:endParaRPr lang="en-US"/>
           </a:p>
@@ -6043,7 +6043,7 @@
           <a:p>
             <a:fld id="{0426E6C6-FEF3-44F4-8DA0-16D7FF019302}" type="datetime1">
               <a:rPr lang="en-US" smtClean="0"/>
-              <a:t>4/27/2022</a:t>
+              <a:t>5/3/2022</a:t>
             </a:fld>
             <a:endParaRPr lang="en-US"/>
           </a:p>
@@ -6332,7 +6332,7 @@
           <a:p>
             <a:fld id="{458340AA-A0FD-474B-AC5A-E7633E5DC2DE}" type="datetime1">
               <a:rPr lang="en-US" smtClean="0"/>
-              <a:t>4/27/2022</a:t>
+              <a:t>5/3/2022</a:t>
             </a:fld>
             <a:endParaRPr lang="en-US"/>
           </a:p>
@@ -6621,7 +6621,7 @@
           <a:p>
             <a:fld id="{664B529B-4953-432D-B03F-EB211F8D37A1}" type="datetime1">
               <a:rPr lang="en-US" smtClean="0"/>
-              <a:t>4/27/2022</a:t>
+              <a:t>5/3/2022</a:t>
             </a:fld>
             <a:endParaRPr lang="en-US"/>
           </a:p>
@@ -6858,7 +6858,7 @@
           <a:p>
             <a:fld id="{79374620-1F65-4CC3-88EB-58C9DD26F46E}" type="datetime1">
               <a:rPr lang="en-US" smtClean="0"/>
-              <a:t>4/27/2022</a:t>
+              <a:t>5/3/2022</a:t>
             </a:fld>
             <a:endParaRPr lang="en-US"/>
           </a:p>
@@ -7315,7 +7315,7 @@
           <a:p>
             <a:fld id="{9E777A18-95EE-4DD8-9BD8-20FC04C50247}" type="datetime1">
               <a:rPr lang="en-US" smtClean="0"/>
-              <a:t>4/27/2022</a:t>
+              <a:t>5/3/2022</a:t>
             </a:fld>
             <a:endParaRPr lang="en-US"/>
           </a:p>
@@ -7506,7 +7506,7 @@
           <a:p>
             <a:fld id="{36C5C674-12AF-41F5-BDE5-1132B29F8CB8}" type="datetime1">
               <a:rPr lang="en-US" smtClean="0"/>
-              <a:t>4/27/2022</a:t>
+              <a:t>5/3/2022</a:t>
             </a:fld>
             <a:endParaRPr lang="en-US"/>
           </a:p>
@@ -9879,7 +9879,7 @@
           <a:p>
             <a:fld id="{3DBA24AA-B7D5-4FFE-8D73-17E57C4CE829}" type="datetime1">
               <a:rPr lang="en-US" smtClean="0"/>
-              <a:t>4/27/2022</a:t>
+              <a:t>5/3/2022</a:t>
             </a:fld>
             <a:endParaRPr lang="en-US"/>
           </a:p>
@@ -10129,7 +10129,7 @@
           <a:p>
             <a:fld id="{2E271776-67EC-484C-8398-831DC4FA5109}" type="datetime1">
               <a:rPr lang="en-US" smtClean="0"/>
-              <a:t>4/27/2022</a:t>
+              <a:t>5/3/2022</a:t>
             </a:fld>
             <a:endParaRPr lang="en-US"/>
           </a:p>
@@ -10515,7 +10515,7 @@
           <a:p>
             <a:fld id="{95147C50-A150-4E7A-B4A5-3F4CF9B1E3B2}" type="datetime1">
               <a:rPr lang="en-US" smtClean="0"/>
-              <a:t>4/27/2022</a:t>
+              <a:t>5/3/2022</a:t>
             </a:fld>
             <a:endParaRPr lang="en-US"/>
           </a:p>
@@ -10775,7 +10775,7 @@
           <a:p>
             <a:fld id="{6EBBE365-CF2F-4A12-A6A4-20E9054E4628}" type="datetime1">
               <a:rPr lang="en-US" smtClean="0"/>
-              <a:t>4/27/2022</a:t>
+              <a:t>5/3/2022</a:t>
             </a:fld>
             <a:endParaRPr lang="en-US"/>
           </a:p>
@@ -12949,7 +12949,7 @@
               <a:rPr lang="en-US" altLang="x-none" sz="6400" dirty="0" err="1">
                 <a:ea typeface="ＭＳ Ｐゴシック" charset="-128"/>
               </a:rPr>
-              <a:t>Barkowski</a:t>
+              <a:t>Barkowsky</a:t>
             </a:r>
             <a:r>
               <a:rPr lang="en-US" altLang="x-none" sz="6400" dirty="0">
@@ -12962,7 +12962,21 @@
                 <a:ea typeface="ＭＳ Ｐゴシック" charset="-128"/>
                 <a:hlinkClick r:id="rId5"/>
               </a:rPr>
-              <a:t>matthias.barkowski@hpi.de</a:t>
+              <a:t>matthias</a:t>
+            </a:r>
+            <a:r>
+              <a:rPr lang="en-US" altLang="x-none" sz="6400">
+                <a:ea typeface="ＭＳ Ｐゴシック" charset="-128"/>
+                <a:hlinkClick r:id="rId5"/>
+              </a:rPr>
+              <a:t>.barkowsky@</a:t>
+            </a:r>
+            <a:r>
+              <a:rPr lang="en-US" altLang="x-none" sz="6400" dirty="0">
+                <a:ea typeface="ＭＳ Ｐゴシック" charset="-128"/>
+                <a:hlinkClick r:id="rId5"/>
+              </a:rPr>
+              <a:t>hpi.de</a:t>
             </a:r>
             <a:r>
               <a:rPr lang="en-US" altLang="x-none" sz="6400" dirty="0">
@@ -29002,8 +29016,8 @@
           </a:p>
         </p:txBody>
       </p:sp>
-      <mc:AlternateContent xmlns:mc="http://schemas.openxmlformats.org/markup-compatibility/2006">
-        <mc:Choice xmlns:a14="http://schemas.microsoft.com/office/drawing/2010/main" Requires="a14">
+      <mc:AlternateContent xmlns:mc="http://schemas.openxmlformats.org/markup-compatibility/2006" xmlns:a14="http://schemas.microsoft.com/office/drawing/2010/main">
+        <mc:Choice Requires="a14">
           <p:sp>
             <p:nvSpPr>
               <p:cNvPr id="3" name="Content Placeholder 2">
@@ -29212,7 +29226,7 @@
             </p:txBody>
           </p:sp>
         </mc:Choice>
-        <mc:Fallback>
+        <mc:Fallback xmlns="">
           <p:sp>
             <p:nvSpPr>
               <p:cNvPr id="3" name="Content Placeholder 2">
@@ -35811,8 +35825,8 @@
           </a:fontRef>
         </p:style>
       </p:cxnSp>
-      <mc:AlternateContent xmlns:mc="http://schemas.openxmlformats.org/markup-compatibility/2006">
-        <mc:Choice xmlns:a14="http://schemas.microsoft.com/office/drawing/2010/main" Requires="a14">
+      <mc:AlternateContent xmlns:mc="http://schemas.openxmlformats.org/markup-compatibility/2006" xmlns:a14="http://schemas.microsoft.com/office/drawing/2010/main">
+        <mc:Choice Requires="a14">
           <p:sp>
             <p:nvSpPr>
               <p:cNvPr id="13" name="TextBox 12">
@@ -35880,7 +35894,7 @@
             </p:txBody>
           </p:sp>
         </mc:Choice>
-        <mc:Fallback>
+        <mc:Fallback xmlns="">
           <p:sp>
             <p:nvSpPr>
               <p:cNvPr id="13" name="TextBox 12">
@@ -40733,8 +40747,8 @@
           </p:sp>
         </mc:Fallback>
       </mc:AlternateContent>
-      <mc:AlternateContent xmlns:mc="http://schemas.openxmlformats.org/markup-compatibility/2006">
-        <mc:Choice xmlns:a14="http://schemas.microsoft.com/office/drawing/2010/main" Requires="a14">
+      <mc:AlternateContent xmlns:mc="http://schemas.openxmlformats.org/markup-compatibility/2006" xmlns:a14="http://schemas.microsoft.com/office/drawing/2010/main">
+        <mc:Choice Requires="a14">
           <p:sp>
             <p:nvSpPr>
               <p:cNvPr id="7" name="TextBox 6">
@@ -41127,7 +41141,7 @@
             </p:txBody>
           </p:sp>
         </mc:Choice>
-        <mc:Fallback>
+        <mc:Fallback xmlns="">
           <p:sp>
             <p:nvSpPr>
               <p:cNvPr id="7" name="TextBox 6">
@@ -41926,8 +41940,8 @@
           </a:p>
         </p:txBody>
       </p:sp>
-      <mc:AlternateContent xmlns:mc="http://schemas.openxmlformats.org/markup-compatibility/2006">
-        <mc:Choice xmlns:a14="http://schemas.microsoft.com/office/drawing/2010/main" Requires="a14">
+      <mc:AlternateContent xmlns:mc="http://schemas.openxmlformats.org/markup-compatibility/2006" xmlns:a14="http://schemas.microsoft.com/office/drawing/2010/main">
+        <mc:Choice Requires="a14">
           <p:sp>
             <p:nvSpPr>
               <p:cNvPr id="3" name="Content Placeholder 2">
@@ -42454,7 +42468,7 @@
             </p:txBody>
           </p:sp>
         </mc:Choice>
-        <mc:Fallback>
+        <mc:Fallback xmlns="">
           <p:sp>
             <p:nvSpPr>
               <p:cNvPr id="3" name="Content Placeholder 2">
@@ -44214,8 +44228,8 @@
           </a:p>
         </p:txBody>
       </p:sp>
-      <mc:AlternateContent xmlns:mc="http://schemas.openxmlformats.org/markup-compatibility/2006">
-        <mc:Choice xmlns:a14="http://schemas.microsoft.com/office/drawing/2010/main" Requires="a14">
+      <mc:AlternateContent xmlns:mc="http://schemas.openxmlformats.org/markup-compatibility/2006" xmlns:a14="http://schemas.microsoft.com/office/drawing/2010/main">
+        <mc:Choice Requires="a14">
           <p:sp>
             <p:nvSpPr>
               <p:cNvPr id="3" name="Content Placeholder 2">
@@ -44376,7 +44390,7 @@
             </p:txBody>
           </p:sp>
         </mc:Choice>
-        <mc:Fallback>
+        <mc:Fallback xmlns="">
           <p:sp>
             <p:nvSpPr>
               <p:cNvPr id="3" name="Content Placeholder 2">
@@ -50345,8 +50359,8 @@
           </a:p>
         </p:txBody>
       </p:sp>
-      <mc:AlternateContent xmlns:mc="http://schemas.openxmlformats.org/markup-compatibility/2006">
-        <mc:Choice xmlns:a14="http://schemas.microsoft.com/office/drawing/2010/main" Requires="a14">
+      <mc:AlternateContent xmlns:mc="http://schemas.openxmlformats.org/markup-compatibility/2006" xmlns:a14="http://schemas.microsoft.com/office/drawing/2010/main">
+        <mc:Choice Requires="a14">
           <p:sp>
             <p:nvSpPr>
               <p:cNvPr id="3" name="Content Placeholder 2">
@@ -50818,7 +50832,7 @@
             </p:txBody>
           </p:sp>
         </mc:Choice>
-        <mc:Fallback>
+        <mc:Fallback xmlns="">
           <p:sp>
             <p:nvSpPr>
               <p:cNvPr id="3" name="Content Placeholder 2">

</xml_diff>